<commit_message>
Adding the updated file
</commit_message>
<xml_diff>
--- a/LendingClubCaseStudy.pptx
+++ b/LendingClubCaseStudy.pptx
@@ -3175,9 +3175,10 @@
           <a:lstStyle/>
           <a:p>
             <a:r>
-              <a:rPr lang="en-US" sz="3800"/>
-              <a:t>Bivariate Analysis - Binning</a:t>
-            </a:r>
+              <a:rPr lang="en-IN" sz="3800" dirty="0"/>
+              <a:t>Segmented Univariate Analysis</a:t>
+            </a:r>
+            <a:endParaRPr lang="en-US" sz="3800" dirty="0"/>
           </a:p>
         </p:txBody>
       </p:sp>
@@ -3496,15 +3497,22 @@
         <p:spPr>
           <a:xfrm>
             <a:off x="630936" y="639520"/>
-            <a:ext cx="3429000" cy="1719072"/>
+            <a:ext cx="3835556" cy="1719072"/>
           </a:xfrm>
         </p:spPr>
         <p:txBody>
           <a:bodyPr anchor="b">
-            <a:normAutofit/>
+            <a:normAutofit fontScale="90000"/>
           </a:bodyPr>
           <a:lstStyle/>
           <a:p>
+            <a:r>
+              <a:rPr lang="en-US" sz="4600" dirty="0"/>
+              <a:t>Bivariate Analysis</a:t>
+            </a:r>
+            <a:br>
+              <a:rPr lang="en-US" sz="4600" dirty="0"/>
+            </a:br>
             <a:r>
               <a:rPr lang="en-US" sz="4600" dirty="0"/>
               <a:t>Loan Status vs Term</a:t>
@@ -8478,11 +8486,15 @@
           </a:bodyPr>
           <a:lstStyle/>
           <a:p>
-            <a:r>
-              <a:rPr lang="en-IN" sz="3800"/>
-              <a:t>Univariate and Segmented Univariate Analysis</a:t>
-            </a:r>
-            <a:endParaRPr lang="en-US" sz="3800"/>
+            <a:pPr algn="ctr"/>
+            <a:r>
+              <a:rPr lang="en-IN" sz="3800" dirty="0"/>
+              <a:t>Univariate Analysis</a:t>
+            </a:r>
+            <a:br>
+              <a:rPr lang="en-IN" sz="3800" dirty="0"/>
+            </a:br>
+            <a:endParaRPr lang="en-US" sz="3800" dirty="0"/>
           </a:p>
         </p:txBody>
       </p:sp>
@@ -8515,33 +8527,33 @@
           <a:lstStyle/>
           <a:p>
             <a:r>
-              <a:rPr lang="en-US" sz="2000"/>
+              <a:rPr lang="en-US" sz="2000" dirty="0"/>
               <a:t>Univariate Analysis was done one major items like loan amount, installment, annual income and others. </a:t>
             </a:r>
           </a:p>
           <a:p>
             <a:r>
-              <a:rPr lang="en-US" sz="2000"/>
+              <a:rPr lang="en-US" sz="2000" dirty="0"/>
               <a:t>We found that there are many outliers in the system.</a:t>
             </a:r>
           </a:p>
           <a:p>
             <a:r>
-              <a:rPr lang="en-US" sz="2000"/>
+              <a:rPr lang="en-US" sz="2000" dirty="0"/>
               <a:t>Few of the plots are as follows</a:t>
             </a:r>
           </a:p>
           <a:p>
             <a:r>
-              <a:rPr lang="en-US" sz="2000"/>
+              <a:rPr lang="en-US" sz="2000" dirty="0"/>
               <a:t>Annual Income , Interest Rates, Installment and Loan Amount etc.</a:t>
             </a:r>
           </a:p>
           <a:p>
-            <a:endParaRPr lang="en-US" sz="2000"/>
-          </a:p>
-          <a:p>
-            <a:endParaRPr lang="en-US" sz="2000"/>
+            <a:endParaRPr lang="en-US" sz="2000" dirty="0"/>
+          </a:p>
+          <a:p>
+            <a:endParaRPr lang="en-US" sz="2000" dirty="0"/>
           </a:p>
         </p:txBody>
       </p:sp>
@@ -8732,9 +8744,10 @@
           <a:lstStyle/>
           <a:p>
             <a:r>
-              <a:rPr lang="en-US" sz="5400"/>
-              <a:t>Bivariate Analysis</a:t>
-            </a:r>
+              <a:rPr lang="en-IN" sz="5400" dirty="0"/>
+              <a:t>Segmented Univariate Analysis</a:t>
+            </a:r>
+            <a:endParaRPr lang="en-US" sz="5400" dirty="0"/>
           </a:p>
         </p:txBody>
       </p:sp>
@@ -8910,19 +8923,20 @@
         <p:spPr>
           <a:xfrm>
             <a:off x="630936" y="640080"/>
-            <a:ext cx="4818888" cy="1481328"/>
+            <a:ext cx="5465064" cy="1481328"/>
           </a:xfrm>
         </p:spPr>
         <p:txBody>
           <a:bodyPr anchor="b">
-            <a:normAutofit/>
+            <a:normAutofit fontScale="90000"/>
           </a:bodyPr>
           <a:lstStyle/>
           <a:p>
             <a:r>
-              <a:rPr lang="en-US" sz="5000"/>
-              <a:t>Bivariate Analysis</a:t>
-            </a:r>
+              <a:rPr lang="en-IN" sz="5400" dirty="0"/>
+              <a:t>Segmented Univariate Analysis</a:t>
+            </a:r>
+            <a:endParaRPr lang="en-US" sz="5000" dirty="0"/>
           </a:p>
         </p:txBody>
       </p:sp>

</xml_diff>